<commit_message>
Added python implementation of dijkstras
</commit_message>
<xml_diff>
--- a/11 - Djikstra's Algorithm/Dijkstra.pptx
+++ b/11 - Djikstra's Algorithm/Dijkstra.pptx
@@ -369,7 +369,7 @@
           <a:p>
             <a:fld id="{F666E1FD-E7A0-497B-BBC0-740BAAC97C64}" type="datetimeFigureOut">
               <a:rPr lang="en-PH" smtClean="0"/>
-              <a:t>16/10/2023</a:t>
+              <a:t>10/19/23</a:t>
             </a:fld>
             <a:endParaRPr lang="en-PH"/>
           </a:p>
@@ -2469,7 +2469,7 @@
           <a:p>
             <a:fld id="{0CCF0B81-6BD8-4C65-9459-815598C5F1F4}" type="datetimeFigureOut">
               <a:rPr lang="en-PH" smtClean="0"/>
-              <a:t>16/10/2023</a:t>
+              <a:t>10/19/23</a:t>
             </a:fld>
             <a:endParaRPr lang="en-PH"/>
           </a:p>
@@ -2669,7 +2669,7 @@
           <a:p>
             <a:fld id="{0CCF0B81-6BD8-4C65-9459-815598C5F1F4}" type="datetimeFigureOut">
               <a:rPr lang="en-PH" smtClean="0"/>
-              <a:t>16/10/2023</a:t>
+              <a:t>10/19/23</a:t>
             </a:fld>
             <a:endParaRPr lang="en-PH"/>
           </a:p>
@@ -2879,7 +2879,7 @@
           <a:p>
             <a:fld id="{0CCF0B81-6BD8-4C65-9459-815598C5F1F4}" type="datetimeFigureOut">
               <a:rPr lang="en-PH" smtClean="0"/>
-              <a:t>16/10/2023</a:t>
+              <a:t>10/19/23</a:t>
             </a:fld>
             <a:endParaRPr lang="en-PH"/>
           </a:p>
@@ -3079,7 +3079,7 @@
           <a:p>
             <a:fld id="{0CCF0B81-6BD8-4C65-9459-815598C5F1F4}" type="datetimeFigureOut">
               <a:rPr lang="en-PH" smtClean="0"/>
-              <a:t>16/10/2023</a:t>
+              <a:t>10/19/23</a:t>
             </a:fld>
             <a:endParaRPr lang="en-PH"/>
           </a:p>
@@ -3355,7 +3355,7 @@
           <a:p>
             <a:fld id="{0CCF0B81-6BD8-4C65-9459-815598C5F1F4}" type="datetimeFigureOut">
               <a:rPr lang="en-PH" smtClean="0"/>
-              <a:t>16/10/2023</a:t>
+              <a:t>10/19/23</a:t>
             </a:fld>
             <a:endParaRPr lang="en-PH"/>
           </a:p>
@@ -3623,7 +3623,7 @@
           <a:p>
             <a:fld id="{0CCF0B81-6BD8-4C65-9459-815598C5F1F4}" type="datetimeFigureOut">
               <a:rPr lang="en-PH" smtClean="0"/>
-              <a:t>16/10/2023</a:t>
+              <a:t>10/19/23</a:t>
             </a:fld>
             <a:endParaRPr lang="en-PH"/>
           </a:p>
@@ -4038,7 +4038,7 @@
           <a:p>
             <a:fld id="{0CCF0B81-6BD8-4C65-9459-815598C5F1F4}" type="datetimeFigureOut">
               <a:rPr lang="en-PH" smtClean="0"/>
-              <a:t>16/10/2023</a:t>
+              <a:t>10/19/23</a:t>
             </a:fld>
             <a:endParaRPr lang="en-PH"/>
           </a:p>
@@ -4180,7 +4180,7 @@
           <a:p>
             <a:fld id="{0CCF0B81-6BD8-4C65-9459-815598C5F1F4}" type="datetimeFigureOut">
               <a:rPr lang="en-PH" smtClean="0"/>
-              <a:t>16/10/2023</a:t>
+              <a:t>10/19/23</a:t>
             </a:fld>
             <a:endParaRPr lang="en-PH"/>
           </a:p>
@@ -4293,7 +4293,7 @@
           <a:p>
             <a:fld id="{0CCF0B81-6BD8-4C65-9459-815598C5F1F4}" type="datetimeFigureOut">
               <a:rPr lang="en-PH" smtClean="0"/>
-              <a:t>16/10/2023</a:t>
+              <a:t>10/19/23</a:t>
             </a:fld>
             <a:endParaRPr lang="en-PH"/>
           </a:p>
@@ -4606,7 +4606,7 @@
           <a:p>
             <a:fld id="{0CCF0B81-6BD8-4C65-9459-815598C5F1F4}" type="datetimeFigureOut">
               <a:rPr lang="en-PH" smtClean="0"/>
-              <a:t>16/10/2023</a:t>
+              <a:t>10/19/23</a:t>
             </a:fld>
             <a:endParaRPr lang="en-PH"/>
           </a:p>
@@ -4895,7 +4895,7 @@
           <a:p>
             <a:fld id="{0CCF0B81-6BD8-4C65-9459-815598C5F1F4}" type="datetimeFigureOut">
               <a:rPr lang="en-PH" smtClean="0"/>
-              <a:t>16/10/2023</a:t>
+              <a:t>10/19/23</a:t>
             </a:fld>
             <a:endParaRPr lang="en-PH"/>
           </a:p>
@@ -5138,7 +5138,7 @@
           <a:p>
             <a:fld id="{0CCF0B81-6BD8-4C65-9459-815598C5F1F4}" type="datetimeFigureOut">
               <a:rPr lang="en-PH" smtClean="0"/>
-              <a:t>16/10/2023</a:t>
+              <a:t>10/19/23</a:t>
             </a:fld>
             <a:endParaRPr lang="en-PH"/>
           </a:p>
@@ -20965,7 +20965,7 @@
         </p:nvSpPr>
         <p:spPr>
           <a:xfrm>
-            <a:off x="1524000" y="1516449"/>
+            <a:off x="1524000" y="1215609"/>
             <a:ext cx="9144000" cy="4290585"/>
           </a:xfrm>
           <a:prstGeom prst="rect">
@@ -21001,47 +21001,65 @@
               <a:buChar char="q"/>
             </a:pPr>
             <a:r>
-              <a:rPr lang="en-US" sz="3100" b="1" dirty="0"/>
+              <a:rPr lang="en-US" sz="3000" dirty="0"/>
               <a:t>In greedy methods, problems are solved in stages by taking one step at a time and considering one input at a time to get the optimal solution.</a:t>
             </a:r>
+          </a:p>
+          <a:p>
+            <a:pPr algn="l"/>
+            <a:endParaRPr lang="en-US" sz="3000" dirty="0"/>
           </a:p>
           <a:p>
             <a:pPr marL="457200" indent="-457200" algn="l">
               <a:buFont typeface="Wingdings" panose="05000000000000000000" pitchFamily="2" charset="2"/>
               <a:buChar char="q"/>
             </a:pPr>
-            <a:endParaRPr lang="en-US" sz="3100" b="1" dirty="0"/>
+            <a:r>
+              <a:rPr lang="en-PH" sz="3000" dirty="0"/>
+              <a:t>A greedy algorithm is an approach for solving a problem by </a:t>
+            </a:r>
+            <a:r>
+              <a:rPr lang="en-PH" sz="3000" b="1" dirty="0">
+                <a:solidFill>
+                  <a:srgbClr val="00B0F0"/>
+                </a:solidFill>
+              </a:rPr>
+              <a:t>selecting the best option available at the moment</a:t>
+            </a:r>
+            <a:r>
+              <a:rPr lang="en-PH" sz="3000" dirty="0"/>
+              <a:t>. </a:t>
+            </a:r>
           </a:p>
           <a:p>
             <a:pPr marL="457200" indent="-457200" algn="l">
               <a:buFont typeface="Wingdings" panose="05000000000000000000" pitchFamily="2" charset="2"/>
               <a:buChar char="q"/>
             </a:pPr>
-            <a:endParaRPr lang="en-US" sz="3100" b="1" dirty="0"/>
+            <a:endParaRPr lang="en-PH" sz="3000" dirty="0"/>
           </a:p>
           <a:p>
             <a:pPr marL="457200" indent="-457200" algn="l">
               <a:buFont typeface="Wingdings" panose="05000000000000000000" pitchFamily="2" charset="2"/>
               <a:buChar char="q"/>
             </a:pPr>
-            <a:endParaRPr lang="en-US" sz="3100" b="1" dirty="0"/>
-          </a:p>
-          <a:p>
-            <a:pPr marL="457200" indent="-457200" algn="l">
-              <a:buFont typeface="Wingdings" panose="05000000000000000000" pitchFamily="2" charset="2"/>
-              <a:buChar char="q"/>
-            </a:pPr>
-            <a:endParaRPr lang="en-US" sz="3100" b="1" dirty="0"/>
-          </a:p>
-          <a:p>
-            <a:pPr algn="l"/>
-            <a:endParaRPr lang="en-US" sz="3100" b="1" dirty="0"/>
-          </a:p>
-          <a:p>
-            <a:pPr algn="l"/>
-            <a:endParaRPr lang="en-US" sz="3100" b="1" i="0" dirty="0">
-              <a:effectLst/>
-            </a:endParaRPr>
+            <a:r>
+              <a:rPr lang="en-PH" sz="3000" dirty="0"/>
+              <a:t>It doesn't worry whether the current best result </a:t>
+            </a:r>
+            <a:r>
+              <a:rPr lang="en-PH" sz="3000" b="1" dirty="0">
+                <a:solidFill>
+                  <a:srgbClr val="00B0F0"/>
+                </a:solidFill>
+              </a:rPr>
+              <a:t>will bring the overall optimal result</a:t>
+            </a:r>
+            <a:r>
+              <a:rPr lang="en-PH" sz="3000" dirty="0"/>
+              <a:t>.</a:t>
+            </a:r>
+            <a:endParaRPr lang="en-US" sz="3000" dirty="0"/>
           </a:p>
         </p:txBody>
       </p:sp>
@@ -29547,18 +29565,18 @@
 </file>
 
 <file path=customXml/item2.xml><?xml version="1.0" encoding="utf-8"?>
-<p:properties xmlns:p="http://schemas.microsoft.com/office/2006/metadata/properties" xmlns:xsi="http://www.w3.org/2001/XMLSchema-instance" xmlns:pc="http://schemas.microsoft.com/office/infopath/2007/PartnerControls">
-  <documentManagement/>
-</p:properties>
-</file>
-
-<file path=customXml/item3.xml><?xml version="1.0" encoding="utf-8"?>
 <?mso-contentType ?>
 <FormTemplates xmlns="http://schemas.microsoft.com/sharepoint/v3/contenttype/forms">
   <Display>DocumentLibraryForm</Display>
   <Edit>DocumentLibraryForm</Edit>
   <New>DocumentLibraryForm</New>
 </FormTemplates>
+</file>
+
+<file path=customXml/item3.xml><?xml version="1.0" encoding="utf-8"?>
+<p:properties xmlns:p="http://schemas.microsoft.com/office/2006/metadata/properties" xmlns:xsi="http://www.w3.org/2001/XMLSchema-instance" xmlns:pc="http://schemas.microsoft.com/office/infopath/2007/PartnerControls">
+  <documentManagement/>
+</p:properties>
 </file>
 
 <file path=customXml/itemProps1.xml><?xml version="1.0" encoding="utf-8"?>
@@ -29580,18 +29598,18 @@
 </file>
 
 <file path=customXml/itemProps2.xml><?xml version="1.0" encoding="utf-8"?>
+<ds:datastoreItem xmlns:ds="http://schemas.openxmlformats.org/officeDocument/2006/customXml" ds:itemID="{9B581377-EEB2-4328-AE7B-28AFF713949D}">
+  <ds:schemaRefs>
+    <ds:schemaRef ds:uri="http://schemas.microsoft.com/sharepoint/v3/contenttype/forms"/>
+  </ds:schemaRefs>
+</ds:datastoreItem>
+</file>
+
+<file path=customXml/itemProps3.xml><?xml version="1.0" encoding="utf-8"?>
 <ds:datastoreItem xmlns:ds="http://schemas.openxmlformats.org/officeDocument/2006/customXml" ds:itemID="{ACC4AF44-0D91-4B61-B80D-EBAA56943EE2}">
   <ds:schemaRefs>
     <ds:schemaRef ds:uri="http://schemas.microsoft.com/office/2006/metadata/properties"/>
     <ds:schemaRef ds:uri="http://schemas.microsoft.com/office/infopath/2007/PartnerControls"/>
   </ds:schemaRefs>
 </ds:datastoreItem>
-</file>
-
-<file path=customXml/itemProps3.xml><?xml version="1.0" encoding="utf-8"?>
-<ds:datastoreItem xmlns:ds="http://schemas.openxmlformats.org/officeDocument/2006/customXml" ds:itemID="{9B581377-EEB2-4328-AE7B-28AFF713949D}">
-  <ds:schemaRefs>
-    <ds:schemaRef ds:uri="http://schemas.microsoft.com/sharepoint/v3/contenttype/forms"/>
-  </ds:schemaRefs>
-</ds:datastoreItem>
 </file>
</xml_diff>